<commit_message>
requirment list 1/3 update
</commit_message>
<xml_diff>
--- a/Requirement.pptx
+++ b/Requirement.pptx
@@ -6,8 +6,8 @@
   </p:sldMasterIdLst>
   <p:sldIdLst>
     <p:sldId id="256" r:id="rId2"/>
-    <p:sldId id="258" r:id="rId3"/>
-    <p:sldId id="259" r:id="rId4"/>
+    <p:sldId id="259" r:id="rId3"/>
+    <p:sldId id="258" r:id="rId4"/>
   </p:sldIdLst>
   <p:sldSz cx="12192000" cy="6858000"/>
   <p:notesSz cx="6858000" cy="9144000"/>
@@ -106,6 +106,11 @@
       </a:defRPr>
     </a:lvl9pPr>
   </p:defaultTextStyle>
+  <p:extLst>
+    <p:ext uri="{EFAFB233-063F-42B5-8137-9DF3F51BA10A}">
+      <p15:sldGuideLst xmlns:p15="http://schemas.microsoft.com/office/powerpoint/2012/main"/>
+    </p:ext>
+  </p:extLst>
 </p:presentation>
 </file>
 
@@ -258,7 +263,7 @@
           <a:p>
             <a:fld id="{6E115D2A-B720-DA4C-BD7C-758C4A1989AB}" type="datetimeFigureOut">
               <a:rPr kumimoji="1" lang="ko-Kore-KR" altLang="en-US" smtClean="0"/>
-              <a:t>2022. 4. 23.</a:t>
+              <a:t>2022. 4. 25.</a:t>
             </a:fld>
             <a:endParaRPr kumimoji="1" lang="ko-Kore-KR" altLang="en-US"/>
           </a:p>
@@ -458,7 +463,7 @@
           <a:p>
             <a:fld id="{6E115D2A-B720-DA4C-BD7C-758C4A1989AB}" type="datetimeFigureOut">
               <a:rPr kumimoji="1" lang="ko-Kore-KR" altLang="en-US" smtClean="0"/>
-              <a:t>2022. 4. 23.</a:t>
+              <a:t>2022. 4. 25.</a:t>
             </a:fld>
             <a:endParaRPr kumimoji="1" lang="ko-Kore-KR" altLang="en-US"/>
           </a:p>
@@ -668,7 +673,7 @@
           <a:p>
             <a:fld id="{6E115D2A-B720-DA4C-BD7C-758C4A1989AB}" type="datetimeFigureOut">
               <a:rPr kumimoji="1" lang="ko-Kore-KR" altLang="en-US" smtClean="0"/>
-              <a:t>2022. 4. 23.</a:t>
+              <a:t>2022. 4. 25.</a:t>
             </a:fld>
             <a:endParaRPr kumimoji="1" lang="ko-Kore-KR" altLang="en-US"/>
           </a:p>
@@ -868,7 +873,7 @@
           <a:p>
             <a:fld id="{6E115D2A-B720-DA4C-BD7C-758C4A1989AB}" type="datetimeFigureOut">
               <a:rPr kumimoji="1" lang="ko-Kore-KR" altLang="en-US" smtClean="0"/>
-              <a:t>2022. 4. 23.</a:t>
+              <a:t>2022. 4. 25.</a:t>
             </a:fld>
             <a:endParaRPr kumimoji="1" lang="ko-Kore-KR" altLang="en-US"/>
           </a:p>
@@ -1144,7 +1149,7 @@
           <a:p>
             <a:fld id="{6E115D2A-B720-DA4C-BD7C-758C4A1989AB}" type="datetimeFigureOut">
               <a:rPr kumimoji="1" lang="ko-Kore-KR" altLang="en-US" smtClean="0"/>
-              <a:t>2022. 4. 23.</a:t>
+              <a:t>2022. 4. 25.</a:t>
             </a:fld>
             <a:endParaRPr kumimoji="1" lang="ko-Kore-KR" altLang="en-US"/>
           </a:p>
@@ -1412,7 +1417,7 @@
           <a:p>
             <a:fld id="{6E115D2A-B720-DA4C-BD7C-758C4A1989AB}" type="datetimeFigureOut">
               <a:rPr kumimoji="1" lang="ko-Kore-KR" altLang="en-US" smtClean="0"/>
-              <a:t>2022. 4. 23.</a:t>
+              <a:t>2022. 4. 25.</a:t>
             </a:fld>
             <a:endParaRPr kumimoji="1" lang="ko-Kore-KR" altLang="en-US"/>
           </a:p>
@@ -1827,7 +1832,7 @@
           <a:p>
             <a:fld id="{6E115D2A-B720-DA4C-BD7C-758C4A1989AB}" type="datetimeFigureOut">
               <a:rPr kumimoji="1" lang="ko-Kore-KR" altLang="en-US" smtClean="0"/>
-              <a:t>2022. 4. 23.</a:t>
+              <a:t>2022. 4. 25.</a:t>
             </a:fld>
             <a:endParaRPr kumimoji="1" lang="ko-Kore-KR" altLang="en-US"/>
           </a:p>
@@ -1969,7 +1974,7 @@
           <a:p>
             <a:fld id="{6E115D2A-B720-DA4C-BD7C-758C4A1989AB}" type="datetimeFigureOut">
               <a:rPr kumimoji="1" lang="ko-Kore-KR" altLang="en-US" smtClean="0"/>
-              <a:t>2022. 4. 23.</a:t>
+              <a:t>2022. 4. 25.</a:t>
             </a:fld>
             <a:endParaRPr kumimoji="1" lang="ko-Kore-KR" altLang="en-US"/>
           </a:p>
@@ -2082,7 +2087,7 @@
           <a:p>
             <a:fld id="{6E115D2A-B720-DA4C-BD7C-758C4A1989AB}" type="datetimeFigureOut">
               <a:rPr kumimoji="1" lang="ko-Kore-KR" altLang="en-US" smtClean="0"/>
-              <a:t>2022. 4. 23.</a:t>
+              <a:t>2022. 4. 25.</a:t>
             </a:fld>
             <a:endParaRPr kumimoji="1" lang="ko-Kore-KR" altLang="en-US"/>
           </a:p>
@@ -2395,7 +2400,7 @@
           <a:p>
             <a:fld id="{6E115D2A-B720-DA4C-BD7C-758C4A1989AB}" type="datetimeFigureOut">
               <a:rPr kumimoji="1" lang="ko-Kore-KR" altLang="en-US" smtClean="0"/>
-              <a:t>2022. 4. 23.</a:t>
+              <a:t>2022. 4. 25.</a:t>
             </a:fld>
             <a:endParaRPr kumimoji="1" lang="ko-Kore-KR" altLang="en-US"/>
           </a:p>
@@ -2684,7 +2689,7 @@
           <a:p>
             <a:fld id="{6E115D2A-B720-DA4C-BD7C-758C4A1989AB}" type="datetimeFigureOut">
               <a:rPr kumimoji="1" lang="ko-Kore-KR" altLang="en-US" smtClean="0"/>
-              <a:t>2022. 4. 23.</a:t>
+              <a:t>2022. 4. 25.</a:t>
             </a:fld>
             <a:endParaRPr kumimoji="1" lang="ko-Kore-KR" altLang="en-US"/>
           </a:p>
@@ -2927,7 +2932,7 @@
           <a:p>
             <a:fld id="{6E115D2A-B720-DA4C-BD7C-758C4A1989AB}" type="datetimeFigureOut">
               <a:rPr kumimoji="1" lang="ko-Kore-KR" altLang="en-US" smtClean="0"/>
-              <a:t>2022. 4. 23.</a:t>
+              <a:t>2022. 4. 25.</a:t>
             </a:fld>
             <a:endParaRPr kumimoji="1" lang="ko-Kore-KR" altLang="en-US"/>
           </a:p>
@@ -3359,14 +3364,14 @@
           <p:nvPr>
             <p:extLst>
               <p:ext uri="{D42A27DB-BD31-4B8C-83A1-F6EECF244321}">
-                <p14:modId xmlns:p14="http://schemas.microsoft.com/office/powerpoint/2010/main" val="528461873"/>
+                <p14:modId xmlns:p14="http://schemas.microsoft.com/office/powerpoint/2010/main" val="740048593"/>
               </p:ext>
             </p:extLst>
           </p:nvPr>
         </p:nvGraphicFramePr>
         <p:xfrm>
           <a:off x="881063" y="871537"/>
-          <a:ext cx="10429873" cy="5675336"/>
+          <a:ext cx="10429873" cy="5245737"/>
         </p:xfrm>
         <a:graphic>
           <a:graphicData uri="http://schemas.openxmlformats.org/drawingml/2006/table">
@@ -3397,7 +3402,7 @@
                   </a:extLst>
                 </a:gridCol>
               </a:tblGrid>
-              <a:tr h="392166">
+              <a:tr h="347704">
                 <a:tc>
                   <a:txBody>
                     <a:bodyPr/>
@@ -3467,7 +3472,7 @@
                   </a:ext>
                 </a:extLst>
               </a:tr>
-              <a:tr h="528317">
+              <a:tr h="598940">
                 <a:tc>
                   <a:txBody>
                     <a:bodyPr/>
@@ -3497,7 +3502,26 @@
                     <a:bodyPr/>
                     <a:lstStyle/>
                     <a:p>
-                      <a:endParaRPr lang="ko-Kore-KR" altLang="en-US" dirty="0"/>
+                      <a:r>
+                        <a:rPr lang="ko-Kore-KR" altLang="en-US" dirty="0"/>
+                        <a:t>회원이 상품명</a:t>
+                      </a:r>
+                      <a:r>
+                        <a:rPr lang="en-US" altLang="ko-Kore-KR" dirty="0"/>
+                        <a:t>, </a:t>
+                      </a:r>
+                      <a:r>
+                        <a:rPr lang="ko-Kore-KR" altLang="en-US" dirty="0"/>
+                        <a:t>가격</a:t>
+                      </a:r>
+                      <a:r>
+                        <a:rPr lang="en-US" altLang="ko-Kore-KR" dirty="0"/>
+                        <a:t>, </a:t>
+                      </a:r>
+                      <a:r>
+                        <a:rPr lang="ko-Kore-KR" altLang="en-US" dirty="0"/>
+                        <a:t>판매종료일 등을 입력하여 자신의 의류를 등록하는 것</a:t>
+                      </a:r>
                     </a:p>
                   </a:txBody>
                   <a:tcPr anchor="ctr">
@@ -3526,7 +3550,10 @@
                     <a:bodyPr/>
                     <a:lstStyle/>
                     <a:p>
-                      <a:endParaRPr lang="ko-Kore-KR" altLang="en-US" dirty="0"/>
+                      <a:r>
+                        <a:rPr lang="ko-Kore-KR" altLang="en-US" dirty="0"/>
+                        <a:t>의류 등록</a:t>
+                      </a:r>
                     </a:p>
                   </a:txBody>
                   <a:tcPr anchor="ctr">
@@ -3547,12 +3574,16 @@
                   </a:ext>
                 </a:extLst>
               </a:tr>
-              <a:tr h="528317">
-                <a:tc>
-                  <a:txBody>
-                    <a:bodyPr/>
-                    <a:lstStyle/>
-                    <a:p>
+              <a:tr h="598940">
+                <a:tc>
+                  <a:txBody>
+                    <a:bodyPr/>
+                    <a:lstStyle/>
+                    <a:p>
+                      <a:r>
+                        <a:rPr lang="en-US" altLang="ko-Kore-KR" dirty="0"/>
+                        <a:t>2</a:t>
+                      </a:r>
                       <a:endParaRPr lang="ko-Kore-KR" altLang="en-US" dirty="0"/>
                     </a:p>
                   </a:txBody>
@@ -3573,7 +3604,10 @@
                     <a:bodyPr/>
                     <a:lstStyle/>
                     <a:p>
-                      <a:endParaRPr lang="ko-Kore-KR" altLang="en-US" dirty="0"/>
+                      <a:r>
+                        <a:rPr lang="ko-Kore-KR" altLang="en-US" dirty="0"/>
+                        <a:t>회원이 자신이 등록한 판매중인 상품들을 조회하고 특정 상품의 정보를 수정하는 것</a:t>
+                      </a:r>
                     </a:p>
                   </a:txBody>
                   <a:tcPr anchor="ctr">
@@ -3602,7 +3636,18 @@
                     <a:bodyPr/>
                     <a:lstStyle/>
                     <a:p>
-                      <a:endParaRPr lang="ko-Kore-KR" altLang="en-US"/>
+                      <a:r>
+                        <a:rPr lang="ko-Kore-KR" altLang="en-US" dirty="0"/>
+                        <a:t>판매중 의류 조회</a:t>
+                      </a:r>
+                      <a:r>
+                        <a:rPr lang="en-US" altLang="ko-KR" dirty="0"/>
+                        <a:t>/</a:t>
+                      </a:r>
+                      <a:r>
+                        <a:rPr lang="ko-Kore-KR" altLang="en-US" dirty="0"/>
+                        <a:t>수정</a:t>
+                      </a:r>
                     </a:p>
                   </a:txBody>
                   <a:tcPr anchor="ctr">
@@ -3623,13 +3668,17 @@
                   </a:ext>
                 </a:extLst>
               </a:tr>
-              <a:tr h="528317">
-                <a:tc>
-                  <a:txBody>
-                    <a:bodyPr/>
-                    <a:lstStyle/>
-                    <a:p>
-                      <a:endParaRPr lang="ko-Kore-KR" altLang="en-US"/>
+              <a:tr h="598940">
+                <a:tc>
+                  <a:txBody>
+                    <a:bodyPr/>
+                    <a:lstStyle/>
+                    <a:p>
+                      <a:r>
+                        <a:rPr lang="en-US" altLang="ko-Kore-KR" dirty="0"/>
+                        <a:t>3</a:t>
+                      </a:r>
+                      <a:endParaRPr lang="ko-Kore-KR" altLang="en-US" dirty="0"/>
                     </a:p>
                   </a:txBody>
                   <a:tcPr anchor="ctr">
@@ -3649,7 +3698,10 @@
                     <a:bodyPr/>
                     <a:lstStyle/>
                     <a:p>
-                      <a:endParaRPr lang="ko-Kore-KR" altLang="en-US" dirty="0"/>
+                      <a:r>
+                        <a:rPr lang="ko-Kore-KR" altLang="en-US" dirty="0"/>
+                        <a:t>회원이 판매완료된 자신의 상품들을 조회할 수 있고 상품의 정보들을 출력하는 것</a:t>
+                      </a:r>
                     </a:p>
                   </a:txBody>
                   <a:tcPr anchor="ctr">
@@ -3678,7 +3730,10 @@
                     <a:bodyPr/>
                     <a:lstStyle/>
                     <a:p>
-                      <a:endParaRPr lang="ko-Kore-KR" altLang="en-US"/>
+                      <a:r>
+                        <a:rPr lang="ko-Kore-KR" altLang="en-US" dirty="0"/>
+                        <a:t>판매완료 의류 조회</a:t>
+                      </a:r>
                     </a:p>
                   </a:txBody>
                   <a:tcPr anchor="ctr">
@@ -3699,13 +3754,17 @@
                   </a:ext>
                 </a:extLst>
               </a:tr>
-              <a:tr h="528317">
-                <a:tc>
-                  <a:txBody>
-                    <a:bodyPr/>
-                    <a:lstStyle/>
-                    <a:p>
-                      <a:endParaRPr lang="ko-Kore-KR" altLang="en-US"/>
+              <a:tr h="598940">
+                <a:tc>
+                  <a:txBody>
+                    <a:bodyPr/>
+                    <a:lstStyle/>
+                    <a:p>
+                      <a:r>
+                        <a:rPr lang="en-US" altLang="ko-Kore-KR" dirty="0"/>
+                        <a:t>4</a:t>
+                      </a:r>
+                      <a:endParaRPr lang="ko-Kore-KR" altLang="en-US" dirty="0"/>
                     </a:p>
                   </a:txBody>
                   <a:tcPr anchor="ctr">
@@ -3725,7 +3784,10 @@
                     <a:bodyPr/>
                     <a:lstStyle/>
                     <a:p>
-                      <a:endParaRPr lang="ko-Kore-KR" altLang="en-US" dirty="0"/>
+                      <a:r>
+                        <a:rPr lang="ko-Kore-KR" altLang="en-US" dirty="0"/>
+                        <a:t>판매종료일이 되면 상품을 판매완료 상태로 바꾸는 것</a:t>
+                      </a:r>
                     </a:p>
                   </a:txBody>
                   <a:tcPr anchor="ctr">
@@ -3754,7 +3816,10 @@
                     <a:bodyPr/>
                     <a:lstStyle/>
                     <a:p>
-                      <a:endParaRPr lang="ko-Kore-KR" altLang="en-US"/>
+                      <a:r>
+                        <a:rPr lang="ko-Kore-KR" altLang="en-US" dirty="0"/>
+                        <a:t>판매 종료</a:t>
+                      </a:r>
                     </a:p>
                   </a:txBody>
                   <a:tcPr anchor="ctr">
@@ -3775,13 +3840,17 @@
                   </a:ext>
                 </a:extLst>
               </a:tr>
-              <a:tr h="528317">
-                <a:tc>
-                  <a:txBody>
-                    <a:bodyPr/>
-                    <a:lstStyle/>
-                    <a:p>
-                      <a:endParaRPr lang="ko-Kore-KR" altLang="en-US"/>
+              <a:tr h="468419">
+                <a:tc>
+                  <a:txBody>
+                    <a:bodyPr/>
+                    <a:lstStyle/>
+                    <a:p>
+                      <a:r>
+                        <a:rPr lang="en-US" altLang="ko-Kore-KR" dirty="0"/>
+                        <a:t>5</a:t>
+                      </a:r>
+                      <a:endParaRPr lang="ko-Kore-KR" altLang="en-US" dirty="0"/>
                     </a:p>
                   </a:txBody>
                   <a:tcPr anchor="ctr">
@@ -3801,7 +3870,38 @@
                     <a:bodyPr/>
                     <a:lstStyle/>
                     <a:p>
-                      <a:endParaRPr lang="ko-Kore-KR" altLang="en-US" dirty="0"/>
+                      <a:pPr marL="0" marR="0" lvl="0" indent="0" algn="l" defTabSz="914400" rtl="0" eaLnBrk="1" fontAlgn="auto" latinLnBrk="0" hangingPunct="1">
+                        <a:lnSpc>
+                          <a:spcPct val="100000"/>
+                        </a:lnSpc>
+                        <a:spcBef>
+                          <a:spcPts val="0"/>
+                        </a:spcBef>
+                        <a:spcAft>
+                          <a:spcPts val="0"/>
+                        </a:spcAft>
+                        <a:buClrTx/>
+                        <a:buSzTx/>
+                        <a:buFontTx/>
+                        <a:buNone/>
+                        <a:tabLst/>
+                        <a:defRPr/>
+                      </a:pPr>
+                      <a:r>
+                        <a:rPr lang="ko-KR" altLang="en-US" sz="1800" kern="1200" dirty="0">
+                          <a:solidFill>
+                            <a:schemeClr val="tx1"/>
+                          </a:solidFill>
+                          <a:effectLst/>
+                          <a:latin typeface="+mn-lt"/>
+                          <a:ea typeface="+mn-ea"/>
+                          <a:cs typeface="+mn-cs"/>
+                        </a:rPr>
+                        <a:t>구매 거래내역을 삭제하는 것</a:t>
+                      </a:r>
+                      <a:endParaRPr lang="ko-KR" altLang="en-US" dirty="0">
+                        <a:effectLst/>
+                      </a:endParaRPr>
                     </a:p>
                   </a:txBody>
                   <a:tcPr anchor="ctr">
@@ -3830,7 +3930,38 @@
                     <a:bodyPr/>
                     <a:lstStyle/>
                     <a:p>
-                      <a:endParaRPr lang="ko-Kore-KR" altLang="en-US" dirty="0"/>
+                      <a:pPr marL="0" marR="0" lvl="0" indent="0" algn="l" defTabSz="914400" rtl="0" eaLnBrk="1" fontAlgn="auto" latinLnBrk="0" hangingPunct="1">
+                        <a:lnSpc>
+                          <a:spcPct val="100000"/>
+                        </a:lnSpc>
+                        <a:spcBef>
+                          <a:spcPts val="0"/>
+                        </a:spcBef>
+                        <a:spcAft>
+                          <a:spcPts val="0"/>
+                        </a:spcAft>
+                        <a:buClrTx/>
+                        <a:buSzTx/>
+                        <a:buFontTx/>
+                        <a:buNone/>
+                        <a:tabLst/>
+                        <a:defRPr/>
+                      </a:pPr>
+                      <a:r>
+                        <a:rPr lang="ko-KR" altLang="en-US" sz="1800" kern="1200" dirty="0">
+                          <a:solidFill>
+                            <a:schemeClr val="tx1"/>
+                          </a:solidFill>
+                          <a:effectLst/>
+                          <a:latin typeface="+mn-lt"/>
+                          <a:ea typeface="+mn-ea"/>
+                          <a:cs typeface="+mn-cs"/>
+                        </a:rPr>
+                        <a:t>상품 구매 내역 삭제 </a:t>
+                      </a:r>
+                      <a:endParaRPr lang="ko-KR" altLang="en-US" dirty="0">
+                        <a:effectLst/>
+                      </a:endParaRPr>
                     </a:p>
                   </a:txBody>
                   <a:tcPr anchor="ctr">
@@ -3851,13 +3982,17 @@
                   </a:ext>
                 </a:extLst>
               </a:tr>
-              <a:tr h="528317">
-                <a:tc>
-                  <a:txBody>
-                    <a:bodyPr/>
-                    <a:lstStyle/>
-                    <a:p>
-                      <a:endParaRPr lang="ko-Kore-KR" altLang="en-US"/>
+              <a:tr h="468419">
+                <a:tc>
+                  <a:txBody>
+                    <a:bodyPr/>
+                    <a:lstStyle/>
+                    <a:p>
+                      <a:r>
+                        <a:rPr lang="en-US" altLang="ko-Kore-KR" dirty="0"/>
+                        <a:t>6</a:t>
+                      </a:r>
+                      <a:endParaRPr lang="ko-Kore-KR" altLang="en-US" dirty="0"/>
                     </a:p>
                   </a:txBody>
                   <a:tcPr anchor="ctr">
@@ -3877,7 +4012,38 @@
                     <a:bodyPr/>
                     <a:lstStyle/>
                     <a:p>
-                      <a:endParaRPr lang="ko-Kore-KR" altLang="en-US" dirty="0"/>
+                      <a:pPr marL="0" marR="0" lvl="0" indent="0" algn="l" defTabSz="914400" rtl="0" eaLnBrk="1" fontAlgn="auto" latinLnBrk="0" hangingPunct="1">
+                        <a:lnSpc>
+                          <a:spcPct val="100000"/>
+                        </a:lnSpc>
+                        <a:spcBef>
+                          <a:spcPts val="0"/>
+                        </a:spcBef>
+                        <a:spcAft>
+                          <a:spcPts val="0"/>
+                        </a:spcAft>
+                        <a:buClrTx/>
+                        <a:buSzTx/>
+                        <a:buFontTx/>
+                        <a:buNone/>
+                        <a:tabLst/>
+                        <a:defRPr/>
+                      </a:pPr>
+                      <a:r>
+                        <a:rPr lang="ko-KR" altLang="en-US" sz="1800" kern="1200" dirty="0">
+                          <a:solidFill>
+                            <a:schemeClr val="tx1"/>
+                          </a:solidFill>
+                          <a:effectLst/>
+                          <a:latin typeface="+mn-lt"/>
+                          <a:ea typeface="+mn-ea"/>
+                          <a:cs typeface="+mn-cs"/>
+                        </a:rPr>
+                        <a:t>회원이 판매한 상품에 대한 총액 및 평균 구매만족도와 구매한 상품에 대한 총액 및 평균 구매만족도를 출력하는 것</a:t>
+                      </a:r>
+                      <a:endParaRPr lang="ko-KR" altLang="en-US" dirty="0">
+                        <a:effectLst/>
+                      </a:endParaRPr>
                     </a:p>
                   </a:txBody>
                   <a:tcPr anchor="ctr">
@@ -3906,7 +4072,18 @@
                     <a:bodyPr/>
                     <a:lstStyle/>
                     <a:p>
-                      <a:endParaRPr lang="ko-Kore-KR" altLang="en-US" dirty="0"/>
+                      <a:r>
+                        <a:rPr lang="ko-Kore-KR" altLang="en-US" dirty="0"/>
+                        <a:t>판매</a:t>
+                      </a:r>
+                      <a:r>
+                        <a:rPr lang="en-US" altLang="ko-Kore-KR" dirty="0"/>
+                        <a:t>/</a:t>
+                      </a:r>
+                      <a:r>
+                        <a:rPr lang="ko-Kore-KR" altLang="en-US" dirty="0"/>
+                        <a:t>구매 내역 출력</a:t>
+                      </a:r>
                     </a:p>
                   </a:txBody>
                   <a:tcPr anchor="ctr">
@@ -3927,13 +4104,13 @@
                   </a:ext>
                 </a:extLst>
               </a:tr>
-              <a:tr h="528317">
-                <a:tc>
-                  <a:txBody>
-                    <a:bodyPr/>
-                    <a:lstStyle/>
-                    <a:p>
-                      <a:endParaRPr lang="ko-Kore-KR" altLang="en-US"/>
+              <a:tr h="468419">
+                <a:tc>
+                  <a:txBody>
+                    <a:bodyPr/>
+                    <a:lstStyle/>
+                    <a:p>
+                      <a:endParaRPr lang="ko-Kore-KR" altLang="en-US" dirty="0"/>
                     </a:p>
                   </a:txBody>
                   <a:tcPr anchor="ctr">
@@ -4003,13 +4180,13 @@
                   </a:ext>
                 </a:extLst>
               </a:tr>
-              <a:tr h="528317">
-                <a:tc>
-                  <a:txBody>
-                    <a:bodyPr/>
-                    <a:lstStyle/>
-                    <a:p>
-                      <a:endParaRPr lang="ko-Kore-KR" altLang="en-US"/>
+              <a:tr h="468419">
+                <a:tc>
+                  <a:txBody>
+                    <a:bodyPr/>
+                    <a:lstStyle/>
+                    <a:p>
+                      <a:endParaRPr lang="ko-Kore-KR" altLang="en-US" dirty="0"/>
                     </a:p>
                   </a:txBody>
                   <a:tcPr anchor="ctr">
@@ -4029,7 +4206,7 @@
                     <a:bodyPr/>
                     <a:lstStyle/>
                     <a:p>
-                      <a:endParaRPr lang="ko-Kore-KR" altLang="en-US"/>
+                      <a:endParaRPr lang="ko-Kore-KR" altLang="en-US" dirty="0"/>
                     </a:p>
                   </a:txBody>
                   <a:tcPr anchor="ctr">
@@ -4076,158 +4253,6 @@
                 <a:extLst>
                   <a:ext uri="{0D108BD9-81ED-4DB2-BD59-A6C34878D82A}">
                     <a16:rowId xmlns:a16="http://schemas.microsoft.com/office/drawing/2014/main" val="1900257851"/>
-                  </a:ext>
-                </a:extLst>
-              </a:tr>
-              <a:tr h="528317">
-                <a:tc>
-                  <a:txBody>
-                    <a:bodyPr/>
-                    <a:lstStyle/>
-                    <a:p>
-                      <a:endParaRPr lang="ko-Kore-KR" altLang="en-US"/>
-                    </a:p>
-                  </a:txBody>
-                  <a:tcPr anchor="ctr">
-                    <a:lnR w="12700" cap="flat" cmpd="sng" algn="ctr">
-                      <a:solidFill>
-                        <a:schemeClr val="tx1"/>
-                      </a:solidFill>
-                      <a:prstDash val="solid"/>
-                      <a:round/>
-                      <a:headEnd type="none" w="med" len="med"/>
-                      <a:tailEnd type="none" w="med" len="med"/>
-                    </a:lnR>
-                  </a:tcPr>
-                </a:tc>
-                <a:tc>
-                  <a:txBody>
-                    <a:bodyPr/>
-                    <a:lstStyle/>
-                    <a:p>
-                      <a:endParaRPr lang="ko-Kore-KR" altLang="en-US" dirty="0"/>
-                    </a:p>
-                  </a:txBody>
-                  <a:tcPr anchor="ctr">
-                    <a:lnL w="12700" cap="flat" cmpd="sng" algn="ctr">
-                      <a:solidFill>
-                        <a:schemeClr val="tx1"/>
-                      </a:solidFill>
-                      <a:prstDash val="solid"/>
-                      <a:round/>
-                      <a:headEnd type="none" w="med" len="med"/>
-                      <a:tailEnd type="none" w="med" len="med"/>
-                    </a:lnL>
-                    <a:lnR w="12700" cap="flat" cmpd="sng" algn="ctr">
-                      <a:solidFill>
-                        <a:schemeClr val="tx1"/>
-                      </a:solidFill>
-                      <a:prstDash val="solid"/>
-                      <a:round/>
-                      <a:headEnd type="none" w="med" len="med"/>
-                      <a:tailEnd type="none" w="med" len="med"/>
-                    </a:lnR>
-                  </a:tcPr>
-                </a:tc>
-                <a:tc>
-                  <a:txBody>
-                    <a:bodyPr/>
-                    <a:lstStyle/>
-                    <a:p>
-                      <a:endParaRPr lang="ko-Kore-KR" altLang="en-US" dirty="0"/>
-                    </a:p>
-                  </a:txBody>
-                  <a:tcPr anchor="ctr">
-                    <a:lnL w="12700" cap="flat" cmpd="sng" algn="ctr">
-                      <a:solidFill>
-                        <a:schemeClr val="tx1"/>
-                      </a:solidFill>
-                      <a:prstDash val="solid"/>
-                      <a:round/>
-                      <a:headEnd type="none" w="med" len="med"/>
-                      <a:tailEnd type="none" w="med" len="med"/>
-                    </a:lnL>
-                  </a:tcPr>
-                </a:tc>
-                <a:extLst>
-                  <a:ext uri="{0D108BD9-81ED-4DB2-BD59-A6C34878D82A}">
-                    <a16:rowId xmlns:a16="http://schemas.microsoft.com/office/drawing/2014/main" val="3263162461"/>
-                  </a:ext>
-                </a:extLst>
-              </a:tr>
-              <a:tr h="528317">
-                <a:tc>
-                  <a:txBody>
-                    <a:bodyPr/>
-                    <a:lstStyle/>
-                    <a:p>
-                      <a:endParaRPr lang="ko-Kore-KR" altLang="en-US"/>
-                    </a:p>
-                  </a:txBody>
-                  <a:tcPr anchor="ctr">
-                    <a:lnR w="12700" cap="flat" cmpd="sng" algn="ctr">
-                      <a:solidFill>
-                        <a:schemeClr val="tx1"/>
-                      </a:solidFill>
-                      <a:prstDash val="solid"/>
-                      <a:round/>
-                      <a:headEnd type="none" w="med" len="med"/>
-                      <a:tailEnd type="none" w="med" len="med"/>
-                    </a:lnR>
-                  </a:tcPr>
-                </a:tc>
-                <a:tc>
-                  <a:txBody>
-                    <a:bodyPr/>
-                    <a:lstStyle/>
-                    <a:p>
-                      <a:endParaRPr lang="ko-Kore-KR" altLang="en-US" dirty="0"/>
-                    </a:p>
-                  </a:txBody>
-                  <a:tcPr anchor="ctr">
-                    <a:lnL w="12700" cap="flat" cmpd="sng" algn="ctr">
-                      <a:solidFill>
-                        <a:schemeClr val="tx1"/>
-                      </a:solidFill>
-                      <a:prstDash val="solid"/>
-                      <a:round/>
-                      <a:headEnd type="none" w="med" len="med"/>
-                      <a:tailEnd type="none" w="med" len="med"/>
-                    </a:lnL>
-                    <a:lnR w="12700" cap="flat" cmpd="sng" algn="ctr">
-                      <a:solidFill>
-                        <a:schemeClr val="tx1"/>
-                      </a:solidFill>
-                      <a:prstDash val="solid"/>
-                      <a:round/>
-                      <a:headEnd type="none" w="med" len="med"/>
-                      <a:tailEnd type="none" w="med" len="med"/>
-                    </a:lnR>
-                  </a:tcPr>
-                </a:tc>
-                <a:tc>
-                  <a:txBody>
-                    <a:bodyPr/>
-                    <a:lstStyle/>
-                    <a:p>
-                      <a:endParaRPr lang="ko-Kore-KR" altLang="en-US" dirty="0"/>
-                    </a:p>
-                  </a:txBody>
-                  <a:tcPr anchor="ctr">
-                    <a:lnL w="12700" cap="flat" cmpd="sng" algn="ctr">
-                      <a:solidFill>
-                        <a:schemeClr val="tx1"/>
-                      </a:solidFill>
-                      <a:prstDash val="solid"/>
-                      <a:round/>
-                      <a:headEnd type="none" w="med" len="med"/>
-                      <a:tailEnd type="none" w="med" len="med"/>
-                    </a:lnL>
-                  </a:tcPr>
-                </a:tc>
-                <a:extLst>
-                  <a:ext uri="{0D108BD9-81ED-4DB2-BD59-A6C34878D82A}">
-                    <a16:rowId xmlns:a16="http://schemas.microsoft.com/office/drawing/2014/main" val="4112746259"/>
                   </a:ext>
                 </a:extLst>
               </a:tr>
@@ -4313,11 +4338,17 @@
           <p:cNvGraphicFramePr>
             <a:graphicFrameLocks noGrp="1"/>
           </p:cNvGraphicFramePr>
-          <p:nvPr/>
+          <p:nvPr>
+            <p:extLst>
+              <p:ext uri="{D42A27DB-BD31-4B8C-83A1-F6EECF244321}">
+                <p14:modId xmlns:p14="http://schemas.microsoft.com/office/powerpoint/2010/main" val="391382306"/>
+              </p:ext>
+            </p:extLst>
+          </p:nvPr>
         </p:nvGraphicFramePr>
         <p:xfrm>
           <a:off x="881063" y="871537"/>
-          <a:ext cx="10429873" cy="5675336"/>
+          <a:ext cx="10429873" cy="4953991"/>
         </p:xfrm>
         <a:graphic>
           <a:graphicData uri="http://schemas.openxmlformats.org/drawingml/2006/table">
@@ -4326,21 +4357,14 @@
                 <a:tableStyleId>{69012ECD-51FC-41F1-AA8D-1B2483CD663E}</a:tableStyleId>
               </a:tblPr>
               <a:tblGrid>
-                <a:gridCol w="985949">
+                <a:gridCol w="1876425">
                   <a:extLst>
                     <a:ext uri="{9D8B030D-6E8A-4147-A177-3AD203B41FA5}">
                       <a16:colId xmlns:a16="http://schemas.microsoft.com/office/drawing/2014/main" val="600303152"/>
                     </a:ext>
                   </a:extLst>
                 </a:gridCol>
-                <a:gridCol w="4858448">
-                  <a:extLst>
-                    <a:ext uri="{9D8B030D-6E8A-4147-A177-3AD203B41FA5}">
-                      <a16:colId xmlns:a16="http://schemas.microsoft.com/office/drawing/2014/main" val="268390004"/>
-                    </a:ext>
-                  </a:extLst>
-                </a:gridCol>
-                <a:gridCol w="4585476">
+                <a:gridCol w="8553448">
                   <a:extLst>
                     <a:ext uri="{9D8B030D-6E8A-4147-A177-3AD203B41FA5}">
                       <a16:colId xmlns:a16="http://schemas.microsoft.com/office/drawing/2014/main" val="1510390368"/>
@@ -4356,7 +4380,7 @@
                     <a:p>
                       <a:r>
                         <a:rPr lang="en-US" altLang="ko-Kore-KR" dirty="0"/>
-                        <a:t>No.</a:t>
+                        <a:t>Actor</a:t>
                       </a:r>
                       <a:endParaRPr lang="ko-Kore-KR" altLang="en-US" dirty="0"/>
                     </a:p>
@@ -4377,7 +4401,7 @@
                     <a:p>
                       <a:r>
                         <a:rPr lang="en-US" altLang="ko-Kore-KR" dirty="0"/>
-                        <a:t>Requirement</a:t>
+                        <a:t>Description</a:t>
                       </a:r>
                       <a:endParaRPr lang="ko-Kore-KR" altLang="en-US" dirty="0"/>
                     </a:p>
@@ -4391,27 +4415,6 @@
                     </a:solidFill>
                   </a:tcPr>
                 </a:tc>
-                <a:tc>
-                  <a:txBody>
-                    <a:bodyPr/>
-                    <a:lstStyle/>
-                    <a:p>
-                      <a:r>
-                        <a:rPr lang="en-US" altLang="ko-Kore-KR" dirty="0"/>
-                        <a:t>Use Case(s)</a:t>
-                      </a:r>
-                      <a:endParaRPr lang="ko-Kore-KR" altLang="en-US" dirty="0"/>
-                    </a:p>
-                  </a:txBody>
-                  <a:tcPr>
-                    <a:solidFill>
-                      <a:schemeClr val="accent1">
-                        <a:lumMod val="60000"/>
-                        <a:lumOff val="40000"/>
-                      </a:schemeClr>
-                    </a:solidFill>
-                  </a:tcPr>
-                </a:tc>
                 <a:extLst>
                   <a:ext uri="{0D108BD9-81ED-4DB2-BD59-A6C34878D82A}">
                     <a16:rowId xmlns:a16="http://schemas.microsoft.com/office/drawing/2014/main" val="3057188334"/>
@@ -4425,10 +4428,9 @@
                     <a:lstStyle/>
                     <a:p>
                       <a:r>
-                        <a:rPr lang="en-US" altLang="ko-Kore-KR" dirty="0"/>
-                        <a:t>1</a:t>
+                        <a:rPr lang="ko-Kore-KR" altLang="en-US" dirty="0"/>
+                        <a:t>회원</a:t>
                       </a:r>
-                      <a:endParaRPr lang="ko-Kore-KR" altLang="en-US" dirty="0"/>
                     </a:p>
                   </a:txBody>
                   <a:tcPr anchor="ctr">
@@ -4448,36 +4450,10 @@
                     <a:bodyPr/>
                     <a:lstStyle/>
                     <a:p>
-                      <a:endParaRPr lang="ko-Kore-KR" altLang="en-US" dirty="0"/>
-                    </a:p>
-                  </a:txBody>
-                  <a:tcPr anchor="ctr">
-                    <a:lnL w="12700" cap="flat" cmpd="sng" algn="ctr">
-                      <a:solidFill>
-                        <a:schemeClr val="tx1"/>
-                      </a:solidFill>
-                      <a:prstDash val="solid"/>
-                      <a:round/>
-                      <a:headEnd type="none" w="med" len="med"/>
-                      <a:tailEnd type="none" w="med" len="med"/>
-                    </a:lnL>
-                    <a:lnR w="12700" cap="flat" cmpd="sng" algn="ctr">
-                      <a:solidFill>
-                        <a:schemeClr val="tx1"/>
-                      </a:solidFill>
-                      <a:prstDash val="solid"/>
-                      <a:round/>
-                      <a:headEnd type="none" w="med" len="med"/>
-                      <a:tailEnd type="none" w="med" len="med"/>
-                    </a:lnR>
-                  </a:tcPr>
-                </a:tc>
-                <a:tc>
-                  <a:txBody>
-                    <a:bodyPr/>
-                    <a:lstStyle/>
-                    <a:p>
-                      <a:endParaRPr lang="ko-Kore-KR" altLang="en-US" dirty="0"/>
+                      <a:r>
+                        <a:rPr lang="ko-Kore-KR" altLang="en-US" dirty="0"/>
+                        <a:t>자신의 물건을 판매하거나 다른 회원의 물건을 구입하는 회원</a:t>
+                      </a:r>
                     </a:p>
                   </a:txBody>
                   <a:tcPr anchor="ctr">
@@ -4504,7 +4480,10 @@
                     <a:bodyPr/>
                     <a:lstStyle/>
                     <a:p>
-                      <a:endParaRPr lang="ko-Kore-KR" altLang="en-US" dirty="0"/>
+                      <a:r>
+                        <a:rPr lang="ko-Kore-KR" altLang="en-US" dirty="0"/>
+                        <a:t>상품 판매 완료 이벤트</a:t>
+                      </a:r>
                     </a:p>
                   </a:txBody>
                   <a:tcPr anchor="ctr">
@@ -4524,36 +4503,10 @@
                     <a:bodyPr/>
                     <a:lstStyle/>
                     <a:p>
-                      <a:endParaRPr lang="ko-Kore-KR" altLang="en-US" dirty="0"/>
-                    </a:p>
-                  </a:txBody>
-                  <a:tcPr anchor="ctr">
-                    <a:lnL w="12700" cap="flat" cmpd="sng" algn="ctr">
-                      <a:solidFill>
-                        <a:schemeClr val="tx1"/>
-                      </a:solidFill>
-                      <a:prstDash val="solid"/>
-                      <a:round/>
-                      <a:headEnd type="none" w="med" len="med"/>
-                      <a:tailEnd type="none" w="med" len="med"/>
-                    </a:lnL>
-                    <a:lnR w="12700" cap="flat" cmpd="sng" algn="ctr">
-                      <a:solidFill>
-                        <a:schemeClr val="tx1"/>
-                      </a:solidFill>
-                      <a:prstDash val="solid"/>
-                      <a:round/>
-                      <a:headEnd type="none" w="med" len="med"/>
-                      <a:tailEnd type="none" w="med" len="med"/>
-                    </a:lnR>
-                  </a:tcPr>
-                </a:tc>
-                <a:tc>
-                  <a:txBody>
-                    <a:bodyPr/>
-                    <a:lstStyle/>
-                    <a:p>
-                      <a:endParaRPr lang="ko-Kore-KR" altLang="en-US"/>
+                      <a:r>
+                        <a:rPr lang="ko-Kore-KR" altLang="en-US" dirty="0"/>
+                        <a:t>상품의 판매 종료일이 되면 상품을 판매 완료 상태로 만드는 이벤트</a:t>
+                      </a:r>
                     </a:p>
                   </a:txBody>
                   <a:tcPr anchor="ctr">
@@ -4580,7 +4533,10 @@
                     <a:bodyPr/>
                     <a:lstStyle/>
                     <a:p>
-                      <a:endParaRPr lang="ko-Kore-KR" altLang="en-US"/>
+                      <a:r>
+                        <a:rPr lang="ko-Kore-KR" altLang="en-US" dirty="0"/>
+                        <a:t>거래내역 자동 삭제 이벤트</a:t>
+                      </a:r>
                     </a:p>
                   </a:txBody>
                   <a:tcPr anchor="ctr">
@@ -4600,36 +4556,14 @@
                     <a:bodyPr/>
                     <a:lstStyle/>
                     <a:p>
-                      <a:endParaRPr lang="ko-Kore-KR" altLang="en-US" dirty="0"/>
-                    </a:p>
-                  </a:txBody>
-                  <a:tcPr anchor="ctr">
-                    <a:lnL w="12700" cap="flat" cmpd="sng" algn="ctr">
-                      <a:solidFill>
-                        <a:schemeClr val="tx1"/>
-                      </a:solidFill>
-                      <a:prstDash val="solid"/>
-                      <a:round/>
-                      <a:headEnd type="none" w="med" len="med"/>
-                      <a:tailEnd type="none" w="med" len="med"/>
-                    </a:lnL>
-                    <a:lnR w="12700" cap="flat" cmpd="sng" algn="ctr">
-                      <a:solidFill>
-                        <a:schemeClr val="tx1"/>
-                      </a:solidFill>
-                      <a:prstDash val="solid"/>
-                      <a:round/>
-                      <a:headEnd type="none" w="med" len="med"/>
-                      <a:tailEnd type="none" w="med" len="med"/>
-                    </a:lnR>
-                  </a:tcPr>
-                </a:tc>
-                <a:tc>
-                  <a:txBody>
-                    <a:bodyPr/>
-                    <a:lstStyle/>
-                    <a:p>
-                      <a:endParaRPr lang="ko-Kore-KR" altLang="en-US"/>
+                      <a:r>
+                        <a:rPr lang="en-US" altLang="ko-Kore-KR" dirty="0"/>
+                        <a:t>6</a:t>
+                      </a:r>
+                      <a:r>
+                        <a:rPr lang="ko-Kore-KR" altLang="en-US" dirty="0"/>
+                        <a:t>개월이 지난 거래내역을 자동으로 삭제해주는 이벤트</a:t>
+                      </a:r>
                     </a:p>
                   </a:txBody>
                   <a:tcPr anchor="ctr">
@@ -4656,7 +4590,10 @@
                     <a:bodyPr/>
                     <a:lstStyle/>
                     <a:p>
-                      <a:endParaRPr lang="ko-Kore-KR" altLang="en-US"/>
+                      <a:r>
+                        <a:rPr lang="ko-Kore-KR" altLang="en-US" dirty="0"/>
+                        <a:t>구매 통계 정보 공지 이벤트</a:t>
+                      </a:r>
                     </a:p>
                   </a:txBody>
                   <a:tcPr anchor="ctr">
@@ -4676,112 +4613,38 @@
                     <a:bodyPr/>
                     <a:lstStyle/>
                     <a:p>
-                      <a:endParaRPr lang="ko-Kore-KR" altLang="en-US" dirty="0"/>
-                    </a:p>
-                  </a:txBody>
-                  <a:tcPr anchor="ctr">
-                    <a:lnL w="12700" cap="flat" cmpd="sng" algn="ctr">
-                      <a:solidFill>
-                        <a:schemeClr val="tx1"/>
-                      </a:solidFill>
-                      <a:prstDash val="solid"/>
-                      <a:round/>
-                      <a:headEnd type="none" w="med" len="med"/>
-                      <a:tailEnd type="none" w="med" len="med"/>
-                    </a:lnL>
-                    <a:lnR w="12700" cap="flat" cmpd="sng" algn="ctr">
-                      <a:solidFill>
-                        <a:schemeClr val="tx1"/>
-                      </a:solidFill>
-                      <a:prstDash val="solid"/>
-                      <a:round/>
-                      <a:headEnd type="none" w="med" len="med"/>
-                      <a:tailEnd type="none" w="med" len="med"/>
-                    </a:lnR>
-                  </a:tcPr>
-                </a:tc>
-                <a:tc>
-                  <a:txBody>
-                    <a:bodyPr/>
-                    <a:lstStyle/>
-                    <a:p>
-                      <a:endParaRPr lang="ko-Kore-KR" altLang="en-US"/>
-                    </a:p>
-                  </a:txBody>
-                  <a:tcPr anchor="ctr">
-                    <a:lnL w="12700" cap="flat" cmpd="sng" algn="ctr">
-                      <a:solidFill>
-                        <a:schemeClr val="tx1"/>
-                      </a:solidFill>
-                      <a:prstDash val="solid"/>
-                      <a:round/>
-                      <a:headEnd type="none" w="med" len="med"/>
-                      <a:tailEnd type="none" w="med" len="med"/>
-                    </a:lnL>
-                  </a:tcPr>
-                </a:tc>
-                <a:extLst>
-                  <a:ext uri="{0D108BD9-81ED-4DB2-BD59-A6C34878D82A}">
-                    <a16:rowId xmlns:a16="http://schemas.microsoft.com/office/drawing/2014/main" val="3097872992"/>
-                  </a:ext>
-                </a:extLst>
-              </a:tr>
-              <a:tr h="528317">
-                <a:tc>
-                  <a:txBody>
-                    <a:bodyPr/>
-                    <a:lstStyle/>
-                    <a:p>
-                      <a:endParaRPr lang="ko-Kore-KR" altLang="en-US"/>
-                    </a:p>
-                  </a:txBody>
-                  <a:tcPr anchor="ctr">
-                    <a:lnR w="12700" cap="flat" cmpd="sng" algn="ctr">
-                      <a:solidFill>
-                        <a:schemeClr val="tx1"/>
-                      </a:solidFill>
-                      <a:prstDash val="solid"/>
-                      <a:round/>
-                      <a:headEnd type="none" w="med" len="med"/>
-                      <a:tailEnd type="none" w="med" len="med"/>
-                    </a:lnR>
-                  </a:tcPr>
-                </a:tc>
-                <a:tc>
-                  <a:txBody>
-                    <a:bodyPr/>
-                    <a:lstStyle/>
-                    <a:p>
-                      <a:endParaRPr lang="ko-Kore-KR" altLang="en-US" dirty="0"/>
-                    </a:p>
-                  </a:txBody>
-                  <a:tcPr anchor="ctr">
-                    <a:lnL w="12700" cap="flat" cmpd="sng" algn="ctr">
-                      <a:solidFill>
-                        <a:schemeClr val="tx1"/>
-                      </a:solidFill>
-                      <a:prstDash val="solid"/>
-                      <a:round/>
-                      <a:headEnd type="none" w="med" len="med"/>
-                      <a:tailEnd type="none" w="med" len="med"/>
-                    </a:lnL>
-                    <a:lnR w="12700" cap="flat" cmpd="sng" algn="ctr">
-                      <a:solidFill>
-                        <a:schemeClr val="tx1"/>
-                      </a:solidFill>
-                      <a:prstDash val="solid"/>
-                      <a:round/>
-                      <a:headEnd type="none" w="med" len="med"/>
-                      <a:tailEnd type="none" w="med" len="med"/>
-                    </a:lnR>
-                  </a:tcPr>
-                </a:tc>
-                <a:tc>
-                  <a:txBody>
-                    <a:bodyPr/>
-                    <a:lstStyle/>
-                    <a:p>
-                      <a:endParaRPr lang="ko-Kore-KR" altLang="en-US" dirty="0"/>
+                      <a:pPr marL="0" marR="0" lvl="0" indent="0" algn="l" defTabSz="914400" rtl="0" eaLnBrk="1" fontAlgn="auto" latinLnBrk="0" hangingPunct="1">
+                        <a:lnSpc>
+                          <a:spcPct val="100000"/>
+                        </a:lnSpc>
+                        <a:spcBef>
+                          <a:spcPts val="0"/>
+                        </a:spcBef>
+                        <a:spcAft>
+                          <a:spcPts val="0"/>
+                        </a:spcAft>
+                        <a:buClrTx/>
+                        <a:buSzTx/>
+                        <a:buFontTx/>
+                        <a:buNone/>
+                        <a:tabLst/>
+                        <a:defRPr/>
+                      </a:pPr>
+                      <a:r>
+                        <a:rPr lang="ko-KR" altLang="en-US" sz="1800" kern="1200" dirty="0">
+                          <a:solidFill>
+                            <a:schemeClr val="tx1"/>
+                          </a:solidFill>
+                          <a:effectLst/>
+                          <a:latin typeface="+mn-lt"/>
+                          <a:ea typeface="+mn-ea"/>
+                          <a:cs typeface="+mn-cs"/>
+                        </a:rPr>
+                        <a:t>매월 말일에 모든 회원들에게 그 달에 대한 판매 및 구매 통계 정보를 이메일로 공지하는 이벤트</a:t>
+                      </a:r>
+                      <a:endParaRPr lang="ko-KR" altLang="en-US" dirty="0">
+                        <a:effectLst/>
+                      </a:endParaRPr>
                     </a:p>
                   </a:txBody>
                   <a:tcPr anchor="ctr">
@@ -4808,7 +4671,10 @@
                     <a:bodyPr/>
                     <a:lstStyle/>
                     <a:p>
-                      <a:endParaRPr lang="ko-Kore-KR" altLang="en-US"/>
+                      <a:r>
+                        <a:rPr lang="ko-Kore-KR" altLang="en-US" dirty="0"/>
+                        <a:t>이메일 시스템</a:t>
+                      </a:r>
                     </a:p>
                   </a:txBody>
                   <a:tcPr anchor="ctr">
@@ -4828,36 +4694,29 @@
                     <a:bodyPr/>
                     <a:lstStyle/>
                     <a:p>
-                      <a:endParaRPr lang="ko-Kore-KR" altLang="en-US" dirty="0"/>
-                    </a:p>
-                  </a:txBody>
-                  <a:tcPr anchor="ctr">
-                    <a:lnL w="12700" cap="flat" cmpd="sng" algn="ctr">
-                      <a:solidFill>
-                        <a:schemeClr val="tx1"/>
-                      </a:solidFill>
-                      <a:prstDash val="solid"/>
-                      <a:round/>
-                      <a:headEnd type="none" w="med" len="med"/>
-                      <a:tailEnd type="none" w="med" len="med"/>
-                    </a:lnL>
-                    <a:lnR w="12700" cap="flat" cmpd="sng" algn="ctr">
-                      <a:solidFill>
-                        <a:schemeClr val="tx1"/>
-                      </a:solidFill>
-                      <a:prstDash val="solid"/>
-                      <a:round/>
-                      <a:headEnd type="none" w="med" len="med"/>
-                      <a:tailEnd type="none" w="med" len="med"/>
-                    </a:lnR>
-                  </a:tcPr>
-                </a:tc>
-                <a:tc>
-                  <a:txBody>
-                    <a:bodyPr/>
-                    <a:lstStyle/>
-                    <a:p>
-                      <a:endParaRPr lang="ko-Kore-KR" altLang="en-US" dirty="0"/>
+                      <a:pPr marL="0" marR="0" lvl="0" indent="0" algn="l" defTabSz="914400" rtl="0" eaLnBrk="1" fontAlgn="auto" latinLnBrk="0" hangingPunct="1">
+                        <a:lnSpc>
+                          <a:spcPct val="100000"/>
+                        </a:lnSpc>
+                        <a:spcBef>
+                          <a:spcPts val="0"/>
+                        </a:spcBef>
+                        <a:spcAft>
+                          <a:spcPts val="0"/>
+                        </a:spcAft>
+                        <a:buClrTx/>
+                        <a:buSzTx/>
+                        <a:buFontTx/>
+                        <a:buNone/>
+                        <a:tabLst/>
+                        <a:defRPr/>
+                      </a:pPr>
+                      <a:r>
+                        <a:rPr lang="ko-KR" altLang="en-US" dirty="0">
+                          <a:effectLst/>
+                        </a:rPr>
+                        <a:t>외부의 이메일 시스템</a:t>
+                      </a:r>
                     </a:p>
                   </a:txBody>
                   <a:tcPr anchor="ctr">
@@ -4884,7 +4743,10 @@
                     <a:bodyPr/>
                     <a:lstStyle/>
                     <a:p>
-                      <a:endParaRPr lang="ko-Kore-KR" altLang="en-US"/>
+                      <a:r>
+                        <a:rPr lang="ko-Kore-KR" altLang="en-US" dirty="0"/>
+                        <a:t>거래내역 삭제자</a:t>
+                      </a:r>
                     </a:p>
                   </a:txBody>
                   <a:tcPr anchor="ctr">
@@ -4904,36 +4766,27 @@
                     <a:bodyPr/>
                     <a:lstStyle/>
                     <a:p>
-                      <a:endParaRPr lang="ko-Kore-KR" altLang="en-US" dirty="0"/>
-                    </a:p>
-                  </a:txBody>
-                  <a:tcPr anchor="ctr">
-                    <a:lnL w="12700" cap="flat" cmpd="sng" algn="ctr">
-                      <a:solidFill>
-                        <a:schemeClr val="tx1"/>
-                      </a:solidFill>
-                      <a:prstDash val="solid"/>
-                      <a:round/>
-                      <a:headEnd type="none" w="med" len="med"/>
-                      <a:tailEnd type="none" w="med" len="med"/>
-                    </a:lnL>
-                    <a:lnR w="12700" cap="flat" cmpd="sng" algn="ctr">
-                      <a:solidFill>
-                        <a:schemeClr val="tx1"/>
-                      </a:solidFill>
-                      <a:prstDash val="solid"/>
-                      <a:round/>
-                      <a:headEnd type="none" w="med" len="med"/>
-                      <a:tailEnd type="none" w="med" len="med"/>
-                    </a:lnR>
-                  </a:tcPr>
-                </a:tc>
-                <a:tc>
-                  <a:txBody>
-                    <a:bodyPr/>
-                    <a:lstStyle/>
-                    <a:p>
-                      <a:endParaRPr lang="ko-Kore-KR" altLang="en-US" dirty="0"/>
+                      <a:pPr marL="0" marR="0" lvl="0" indent="0" algn="l" defTabSz="914400" rtl="0" eaLnBrk="1" fontAlgn="auto" latinLnBrk="0" hangingPunct="1">
+                        <a:lnSpc>
+                          <a:spcPct val="100000"/>
+                        </a:lnSpc>
+                        <a:spcBef>
+                          <a:spcPts val="0"/>
+                        </a:spcBef>
+                        <a:spcAft>
+                          <a:spcPts val="0"/>
+                        </a:spcAft>
+                        <a:buClrTx/>
+                        <a:buSzTx/>
+                        <a:buFontTx/>
+                        <a:buNone/>
+                        <a:tabLst/>
+                        <a:defRPr/>
+                      </a:pPr>
+                      <a:r>
+                        <a:rPr lang="ko-Kore-KR" altLang="en-US" dirty="0"/>
+                        <a:t>회원과 거래내역 자동 삭제 이벤트의 삭제 기능을 수행하는 역할</a:t>
+                      </a:r>
                     </a:p>
                   </a:txBody>
                   <a:tcPr anchor="ctr">
@@ -4960,39 +4813,10 @@
                     <a:bodyPr/>
                     <a:lstStyle/>
                     <a:p>
-                      <a:endParaRPr lang="ko-Kore-KR" altLang="en-US"/>
+                      <a:endParaRPr lang="ko-Kore-KR" altLang="en-US" dirty="0"/>
                     </a:p>
                   </a:txBody>
                   <a:tcPr anchor="ctr">
-                    <a:lnR w="12700" cap="flat" cmpd="sng" algn="ctr">
-                      <a:solidFill>
-                        <a:schemeClr val="tx1"/>
-                      </a:solidFill>
-                      <a:prstDash val="solid"/>
-                      <a:round/>
-                      <a:headEnd type="none" w="med" len="med"/>
-                      <a:tailEnd type="none" w="med" len="med"/>
-                    </a:lnR>
-                  </a:tcPr>
-                </a:tc>
-                <a:tc>
-                  <a:txBody>
-                    <a:bodyPr/>
-                    <a:lstStyle/>
-                    <a:p>
-                      <a:endParaRPr lang="ko-Kore-KR" altLang="en-US"/>
-                    </a:p>
-                  </a:txBody>
-                  <a:tcPr anchor="ctr">
-                    <a:lnL w="12700" cap="flat" cmpd="sng" algn="ctr">
-                      <a:solidFill>
-                        <a:schemeClr val="tx1"/>
-                      </a:solidFill>
-                      <a:prstDash val="solid"/>
-                      <a:round/>
-                      <a:headEnd type="none" w="med" len="med"/>
-                      <a:tailEnd type="none" w="med" len="med"/>
-                    </a:lnL>
                     <a:lnR w="12700" cap="flat" cmpd="sng" algn="ctr">
                       <a:solidFill>
                         <a:schemeClr val="tx1"/>
@@ -5036,39 +4860,10 @@
                     <a:bodyPr/>
                     <a:lstStyle/>
                     <a:p>
-                      <a:endParaRPr lang="ko-Kore-KR" altLang="en-US"/>
+                      <a:endParaRPr lang="ko-Kore-KR" altLang="en-US" dirty="0"/>
                     </a:p>
                   </a:txBody>
                   <a:tcPr anchor="ctr">
-                    <a:lnR w="12700" cap="flat" cmpd="sng" algn="ctr">
-                      <a:solidFill>
-                        <a:schemeClr val="tx1"/>
-                      </a:solidFill>
-                      <a:prstDash val="solid"/>
-                      <a:round/>
-                      <a:headEnd type="none" w="med" len="med"/>
-                      <a:tailEnd type="none" w="med" len="med"/>
-                    </a:lnR>
-                  </a:tcPr>
-                </a:tc>
-                <a:tc>
-                  <a:txBody>
-                    <a:bodyPr/>
-                    <a:lstStyle/>
-                    <a:p>
-                      <a:endParaRPr lang="ko-Kore-KR" altLang="en-US" dirty="0"/>
-                    </a:p>
-                  </a:txBody>
-                  <a:tcPr anchor="ctr">
-                    <a:lnL w="12700" cap="flat" cmpd="sng" algn="ctr">
-                      <a:solidFill>
-                        <a:schemeClr val="tx1"/>
-                      </a:solidFill>
-                      <a:prstDash val="solid"/>
-                      <a:round/>
-                      <a:headEnd type="none" w="med" len="med"/>
-                      <a:tailEnd type="none" w="med" len="med"/>
-                    </a:lnL>
                     <a:lnR w="12700" cap="flat" cmpd="sng" algn="ctr">
                       <a:solidFill>
                         <a:schemeClr val="tx1"/>
@@ -5103,82 +4898,6 @@
                 <a:extLst>
                   <a:ext uri="{0D108BD9-81ED-4DB2-BD59-A6C34878D82A}">
                     <a16:rowId xmlns:a16="http://schemas.microsoft.com/office/drawing/2014/main" val="3263162461"/>
-                  </a:ext>
-                </a:extLst>
-              </a:tr>
-              <a:tr h="528317">
-                <a:tc>
-                  <a:txBody>
-                    <a:bodyPr/>
-                    <a:lstStyle/>
-                    <a:p>
-                      <a:endParaRPr lang="ko-Kore-KR" altLang="en-US"/>
-                    </a:p>
-                  </a:txBody>
-                  <a:tcPr anchor="ctr">
-                    <a:lnR w="12700" cap="flat" cmpd="sng" algn="ctr">
-                      <a:solidFill>
-                        <a:schemeClr val="tx1"/>
-                      </a:solidFill>
-                      <a:prstDash val="solid"/>
-                      <a:round/>
-                      <a:headEnd type="none" w="med" len="med"/>
-                      <a:tailEnd type="none" w="med" len="med"/>
-                    </a:lnR>
-                  </a:tcPr>
-                </a:tc>
-                <a:tc>
-                  <a:txBody>
-                    <a:bodyPr/>
-                    <a:lstStyle/>
-                    <a:p>
-                      <a:endParaRPr lang="ko-Kore-KR" altLang="en-US" dirty="0"/>
-                    </a:p>
-                  </a:txBody>
-                  <a:tcPr anchor="ctr">
-                    <a:lnL w="12700" cap="flat" cmpd="sng" algn="ctr">
-                      <a:solidFill>
-                        <a:schemeClr val="tx1"/>
-                      </a:solidFill>
-                      <a:prstDash val="solid"/>
-                      <a:round/>
-                      <a:headEnd type="none" w="med" len="med"/>
-                      <a:tailEnd type="none" w="med" len="med"/>
-                    </a:lnL>
-                    <a:lnR w="12700" cap="flat" cmpd="sng" algn="ctr">
-                      <a:solidFill>
-                        <a:schemeClr val="tx1"/>
-                      </a:solidFill>
-                      <a:prstDash val="solid"/>
-                      <a:round/>
-                      <a:headEnd type="none" w="med" len="med"/>
-                      <a:tailEnd type="none" w="med" len="med"/>
-                    </a:lnR>
-                  </a:tcPr>
-                </a:tc>
-                <a:tc>
-                  <a:txBody>
-                    <a:bodyPr/>
-                    <a:lstStyle/>
-                    <a:p>
-                      <a:endParaRPr lang="ko-Kore-KR" altLang="en-US" dirty="0"/>
-                    </a:p>
-                  </a:txBody>
-                  <a:tcPr anchor="ctr">
-                    <a:lnL w="12700" cap="flat" cmpd="sng" algn="ctr">
-                      <a:solidFill>
-                        <a:schemeClr val="tx1"/>
-                      </a:solidFill>
-                      <a:prstDash val="solid"/>
-                      <a:round/>
-                      <a:headEnd type="none" w="med" len="med"/>
-                      <a:tailEnd type="none" w="med" len="med"/>
-                    </a:lnL>
-                  </a:tcPr>
-                </a:tc>
-                <a:extLst>
-                  <a:ext uri="{0D108BD9-81ED-4DB2-BD59-A6C34878D82A}">
-                    <a16:rowId xmlns:a16="http://schemas.microsoft.com/office/drawing/2014/main" val="4112746259"/>
                   </a:ext>
                 </a:extLst>
               </a:tr>
@@ -5201,7 +4920,7 @@
         <p:spPr>
           <a:xfrm>
             <a:off x="881063" y="311127"/>
-            <a:ext cx="4662495" cy="553998"/>
+            <a:ext cx="2904321" cy="553998"/>
           </a:xfrm>
           <a:prstGeom prst="rect">
             <a:avLst/>
@@ -5216,7 +4935,7 @@
           <a:p>
             <a:r>
               <a:rPr kumimoji="1" lang="en-US" altLang="ko-Kore-KR" sz="3000" dirty="0"/>
-              <a:t>non-Functional Requirement</a:t>
+              <a:t>Actor Description</a:t>
             </a:r>
             <a:endParaRPr kumimoji="1" lang="ko-Kore-KR" altLang="en-US" sz="3000" dirty="0"/>
           </a:p>
@@ -5225,7 +4944,7 @@
     </p:spTree>
     <p:extLst>
       <p:ext uri="{BB962C8B-B14F-4D97-AF65-F5344CB8AC3E}">
-        <p14:creationId xmlns:p14="http://schemas.microsoft.com/office/powerpoint/2010/main" val="169672998"/>
+        <p14:creationId xmlns:p14="http://schemas.microsoft.com/office/powerpoint/2010/main" val="2807765067"/>
       </p:ext>
     </p:extLst>
   </p:cSld>
@@ -5267,14 +4986,14 @@
           <p:nvPr>
             <p:extLst>
               <p:ext uri="{D42A27DB-BD31-4B8C-83A1-F6EECF244321}">
-                <p14:modId xmlns:p14="http://schemas.microsoft.com/office/powerpoint/2010/main" val="2273764148"/>
+                <p14:modId xmlns:p14="http://schemas.microsoft.com/office/powerpoint/2010/main" val="3768289079"/>
               </p:ext>
             </p:extLst>
           </p:nvPr>
         </p:nvGraphicFramePr>
         <p:xfrm>
           <a:off x="881063" y="871537"/>
-          <a:ext cx="10429873" cy="5675336"/>
+          <a:ext cx="10499510" cy="5675336"/>
         </p:xfrm>
         <a:graphic>
           <a:graphicData uri="http://schemas.openxmlformats.org/drawingml/2006/table">
@@ -5283,14 +5002,14 @@
                 <a:tableStyleId>{69012ECD-51FC-41F1-AA8D-1B2483CD663E}</a:tableStyleId>
               </a:tblPr>
               <a:tblGrid>
-                <a:gridCol w="1876425">
+                <a:gridCol w="873596">
                   <a:extLst>
                     <a:ext uri="{9D8B030D-6E8A-4147-A177-3AD203B41FA5}">
                       <a16:colId xmlns:a16="http://schemas.microsoft.com/office/drawing/2014/main" val="600303152"/>
                     </a:ext>
                   </a:extLst>
                 </a:gridCol>
-                <a:gridCol w="8553448">
+                <a:gridCol w="9625914">
                   <a:extLst>
                     <a:ext uri="{9D8B030D-6E8A-4147-A177-3AD203B41FA5}">
                       <a16:colId xmlns:a16="http://schemas.microsoft.com/office/drawing/2014/main" val="1510390368"/>
@@ -5306,7 +5025,7 @@
                     <a:p>
                       <a:r>
                         <a:rPr lang="en-US" altLang="ko-Kore-KR" dirty="0"/>
-                        <a:t>Actor</a:t>
+                        <a:t>No.</a:t>
                       </a:r>
                       <a:endParaRPr lang="ko-Kore-KR" altLang="en-US" dirty="0"/>
                     </a:p>
@@ -5327,7 +5046,7 @@
                     <a:p>
                       <a:r>
                         <a:rPr lang="en-US" altLang="ko-Kore-KR" dirty="0"/>
-                        <a:t>Description</a:t>
+                        <a:t>Requirement</a:t>
                       </a:r>
                       <a:endParaRPr lang="ko-Kore-KR" altLang="en-US" dirty="0"/>
                     </a:p>
@@ -5353,6 +5072,10 @@
                     <a:bodyPr/>
                     <a:lstStyle/>
                     <a:p>
+                      <a:r>
+                        <a:rPr lang="en-US" altLang="ko-Kore-KR" dirty="0"/>
+                        <a:t>1</a:t>
+                      </a:r>
                       <a:endParaRPr lang="ko-Kore-KR" altLang="en-US" dirty="0"/>
                     </a:p>
                   </a:txBody>
@@ -5373,6 +5096,22 @@
                     <a:bodyPr/>
                     <a:lstStyle/>
                     <a:p>
+                      <a:r>
+                        <a:rPr lang="ko-Kore-KR" altLang="en-US" dirty="0"/>
+                        <a:t>상품 리스트를 불러올 때 </a:t>
+                      </a:r>
+                      <a:r>
+                        <a:rPr lang="en-US" altLang="ko-Kore-KR" dirty="0"/>
+                        <a:t>1</a:t>
+                      </a:r>
+                      <a:r>
+                        <a:rPr lang="en-US" altLang="ko-KR" dirty="0"/>
+                        <a:t>0</a:t>
+                      </a:r>
+                      <a:r>
+                        <a:rPr lang="ko-KR" altLang="en-US" dirty="0"/>
+                        <a:t>초를 넘겨서는 안된다</a:t>
+                      </a:r>
                       <a:endParaRPr lang="ko-Kore-KR" altLang="en-US" dirty="0"/>
                     </a:p>
                   </a:txBody>
@@ -5447,7 +5186,7 @@
                     <a:bodyPr/>
                     <a:lstStyle/>
                     <a:p>
-                      <a:endParaRPr lang="ko-Kore-KR" altLang="en-US" dirty="0"/>
+                      <a:endParaRPr lang="ko-Kore-KR" altLang="en-US"/>
                     </a:p>
                   </a:txBody>
                   <a:tcPr anchor="ctr">
@@ -5467,7 +5206,7 @@
                     <a:bodyPr/>
                     <a:lstStyle/>
                     <a:p>
-                      <a:endParaRPr lang="ko-Kore-KR" altLang="en-US"/>
+                      <a:endParaRPr lang="ko-Kore-KR" altLang="en-US" dirty="0"/>
                     </a:p>
                   </a:txBody>
                   <a:tcPr anchor="ctr">
@@ -5494,7 +5233,7 @@
                     <a:bodyPr/>
                     <a:lstStyle/>
                     <a:p>
-                      <a:endParaRPr lang="ko-Kore-KR" altLang="en-US" dirty="0"/>
+                      <a:endParaRPr lang="ko-Kore-KR" altLang="en-US"/>
                     </a:p>
                   </a:txBody>
                   <a:tcPr anchor="ctr">
@@ -5541,7 +5280,7 @@
                     <a:bodyPr/>
                     <a:lstStyle/>
                     <a:p>
-                      <a:endParaRPr lang="ko-Kore-KR" altLang="en-US" dirty="0"/>
+                      <a:endParaRPr lang="ko-Kore-KR" altLang="en-US"/>
                     </a:p>
                   </a:txBody>
                   <a:tcPr anchor="ctr">
@@ -5588,7 +5327,7 @@
                     <a:bodyPr/>
                     <a:lstStyle/>
                     <a:p>
-                      <a:endParaRPr lang="ko-Kore-KR" altLang="en-US" dirty="0"/>
+                      <a:endParaRPr lang="ko-Kore-KR" altLang="en-US"/>
                     </a:p>
                   </a:txBody>
                   <a:tcPr anchor="ctr">
@@ -5635,7 +5374,7 @@
                     <a:bodyPr/>
                     <a:lstStyle/>
                     <a:p>
-                      <a:endParaRPr lang="ko-Kore-KR" altLang="en-US" dirty="0"/>
+                      <a:endParaRPr lang="ko-Kore-KR" altLang="en-US"/>
                     </a:p>
                   </a:txBody>
                   <a:tcPr anchor="ctr">
@@ -5682,7 +5421,7 @@
                     <a:bodyPr/>
                     <a:lstStyle/>
                     <a:p>
-                      <a:endParaRPr lang="ko-Kore-KR" altLang="en-US" dirty="0"/>
+                      <a:endParaRPr lang="ko-Kore-KR" altLang="en-US"/>
                     </a:p>
                   </a:txBody>
                   <a:tcPr anchor="ctr">
@@ -5729,7 +5468,7 @@
                     <a:bodyPr/>
                     <a:lstStyle/>
                     <a:p>
-                      <a:endParaRPr lang="ko-Kore-KR" altLang="en-US" dirty="0"/>
+                      <a:endParaRPr lang="ko-Kore-KR" altLang="en-US"/>
                     </a:p>
                   </a:txBody>
                   <a:tcPr anchor="ctr">
@@ -5776,7 +5515,7 @@
                     <a:bodyPr/>
                     <a:lstStyle/>
                     <a:p>
-                      <a:endParaRPr lang="ko-Kore-KR" altLang="en-US" dirty="0"/>
+                      <a:endParaRPr lang="ko-Kore-KR" altLang="en-US"/>
                     </a:p>
                   </a:txBody>
                   <a:tcPr anchor="ctr">
@@ -5836,7 +5575,7 @@
         <p:spPr>
           <a:xfrm>
             <a:off x="881063" y="311127"/>
-            <a:ext cx="2904321" cy="553998"/>
+            <a:ext cx="4662495" cy="553998"/>
           </a:xfrm>
           <a:prstGeom prst="rect">
             <a:avLst/>
@@ -5851,7 +5590,7 @@
           <a:p>
             <a:r>
               <a:rPr kumimoji="1" lang="en-US" altLang="ko-Kore-KR" sz="3000" dirty="0"/>
-              <a:t>Actor Description</a:t>
+              <a:t>non-Functional Requirement</a:t>
             </a:r>
             <a:endParaRPr kumimoji="1" lang="ko-Kore-KR" altLang="en-US" sz="3000" dirty="0"/>
           </a:p>
@@ -5860,7 +5599,7 @@
     </p:spTree>
     <p:extLst>
       <p:ext uri="{BB962C8B-B14F-4D97-AF65-F5344CB8AC3E}">
-        <p14:creationId xmlns:p14="http://schemas.microsoft.com/office/powerpoint/2010/main" val="2807765067"/>
+        <p14:creationId xmlns:p14="http://schemas.microsoft.com/office/powerpoint/2010/main" val="169672998"/>
       </p:ext>
     </p:extLst>
   </p:cSld>

</xml_diff>